<commit_message>
update hw2 + lecture 3
</commit_message>
<xml_diff>
--- a/LectureSlides/01Rust.pptx
+++ b/LectureSlides/01Rust.pptx
@@ -260,7 +260,7 @@
           <a:p>
             <a:fld id="{1935A499-2718-4E21-9189-B225F36281DF}" type="datetimeFigureOut">
               <a:rPr lang="en-US" smtClean="0"/>
-              <a:t>10/20/2024</a:t>
+              <a:t>10/28/2024</a:t>
             </a:fld>
             <a:endParaRPr lang="en-US"/>
           </a:p>
@@ -751,7 +751,7 @@
           <a:p>
             <a:fld id="{7ED1D969-CA5A-4E7D-8836-6A861131C5DB}" type="datetime1">
               <a:rPr lang="en-US" smtClean="0"/>
-              <a:t>10/20/2024</a:t>
+              <a:t>10/28/2024</a:t>
             </a:fld>
             <a:endParaRPr lang="en-US"/>
           </a:p>
@@ -959,7 +959,7 @@
           <a:p>
             <a:fld id="{B50A2AF3-6851-4BD6-A66F-DDC658668A9B}" type="datetime1">
               <a:rPr lang="en-US" smtClean="0"/>
-              <a:t>10/20/2024</a:t>
+              <a:t>10/28/2024</a:t>
             </a:fld>
             <a:endParaRPr lang="en-US"/>
           </a:p>
@@ -1215,7 +1215,7 @@
           <a:p>
             <a:fld id="{CA18A463-958C-4F4B-8E9C-5DBAA4CBA575}" type="datetime1">
               <a:rPr lang="en-US" smtClean="0"/>
-              <a:t>10/20/2024</a:t>
+              <a:t>10/28/2024</a:t>
             </a:fld>
             <a:endParaRPr lang="en-US"/>
           </a:p>
@@ -1400,7 +1400,7 @@
           <a:p>
             <a:fld id="{F0F6E17C-61BF-4395-9125-421877C95553}" type="datetime1">
               <a:rPr lang="en-US" smtClean="0"/>
-              <a:t>10/20/2024</a:t>
+              <a:t>10/28/2024</a:t>
             </a:fld>
             <a:endParaRPr lang="en-US"/>
           </a:p>
@@ -1743,7 +1743,7 @@
           <a:p>
             <a:fld id="{BA04B332-5926-4D67-B0C7-844DF0D44CC6}" type="datetime1">
               <a:rPr lang="en-US" smtClean="0"/>
-              <a:t>10/20/2024</a:t>
+              <a:t>10/28/2024</a:t>
             </a:fld>
             <a:endParaRPr lang="en-US"/>
           </a:p>
@@ -2048,7 +2048,7 @@
           <a:p>
             <a:fld id="{89E0283A-0129-4F5B-A65A-7EF536522C87}" type="datetime1">
               <a:rPr lang="en-US" smtClean="0"/>
-              <a:t>10/20/2024</a:t>
+              <a:t>10/28/2024</a:t>
             </a:fld>
             <a:endParaRPr lang="en-US"/>
           </a:p>
@@ -2457,7 +2457,7 @@
           <a:p>
             <a:fld id="{780EB0A3-576D-48C6-BD4C-0E155D216784}" type="datetime1">
               <a:rPr lang="en-US" smtClean="0"/>
-              <a:t>10/20/2024</a:t>
+              <a:t>10/28/2024</a:t>
             </a:fld>
             <a:endParaRPr lang="en-US"/>
           </a:p>
@@ -2575,7 +2575,7 @@
           <a:p>
             <a:fld id="{86DFE706-FE72-4D96-9E36-C798828A3102}" type="datetime1">
               <a:rPr lang="en-US" smtClean="0"/>
-              <a:t>10/20/2024</a:t>
+              <a:t>10/28/2024</a:t>
             </a:fld>
             <a:endParaRPr lang="en-US"/>
           </a:p>
@@ -2746,7 +2746,7 @@
           <a:p>
             <a:fld id="{21752048-6F10-4768-8FEB-297451A84156}" type="datetime1">
               <a:rPr lang="en-US" smtClean="0"/>
-              <a:t>10/20/2024</a:t>
+              <a:t>10/28/2024</a:t>
             </a:fld>
             <a:endParaRPr lang="en-US"/>
           </a:p>
@@ -3115,7 +3115,7 @@
           <a:p>
             <a:fld id="{5D664C85-27CA-4FBF-93CB-D51A4A471E07}" type="datetime1">
               <a:rPr lang="en-US" smtClean="0"/>
-              <a:t>10/20/2024</a:t>
+              <a:t>10/28/2024</a:t>
             </a:fld>
             <a:endParaRPr lang="en-US"/>
           </a:p>
@@ -3492,7 +3492,7 @@
           <a:p>
             <a:fld id="{00AB68AE-60DD-46B6-88A6-96C02864976B}" type="datetime1">
               <a:rPr lang="en-US" smtClean="0"/>
-              <a:t>10/20/2024</a:t>
+              <a:t>10/28/2024</a:t>
             </a:fld>
             <a:endParaRPr lang="en-US"/>
           </a:p>
@@ -3779,7 +3779,7 @@
           <a:p>
             <a:fld id="{AF6C9163-F6B6-4F39-BAFE-DE93E258B06B}" type="datetime1">
               <a:rPr lang="en-US" smtClean="0"/>
-              <a:t>10/20/2024</a:t>
+              <a:t>10/28/2024</a:t>
             </a:fld>
             <a:endParaRPr lang="en-US"/>
           </a:p>

</xml_diff>